<commit_message>
updates for scratch path
</commit_message>
<xml_diff>
--- a/powerpoint/2_Getting_connected_kennedy.pptx
+++ b/powerpoint/2_Getting_connected_kennedy.pptx
@@ -266,7 +266,7 @@
           <a:p>
             <a:fld id="{A533EB26-2E25-4466-BA1F-4ED20A958A47}" type="datetimeFigureOut">
               <a:rPr lang="en-GB" smtClean="0"/>
-              <a:t>21/09/2022</a:t>
+              <a:t>13/03/2023</a:t>
             </a:fld>
             <a:endParaRPr lang="en-GB"/>
           </a:p>
@@ -466,7 +466,7 @@
           <a:p>
             <a:fld id="{A533EB26-2E25-4466-BA1F-4ED20A958A47}" type="datetimeFigureOut">
               <a:rPr lang="en-GB" smtClean="0"/>
-              <a:t>21/09/2022</a:t>
+              <a:t>13/03/2023</a:t>
             </a:fld>
             <a:endParaRPr lang="en-GB"/>
           </a:p>
@@ -676,7 +676,7 @@
           <a:p>
             <a:fld id="{A533EB26-2E25-4466-BA1F-4ED20A958A47}" type="datetimeFigureOut">
               <a:rPr lang="en-GB" smtClean="0"/>
-              <a:t>21/09/2022</a:t>
+              <a:t>13/03/2023</a:t>
             </a:fld>
             <a:endParaRPr lang="en-GB"/>
           </a:p>
@@ -876,7 +876,7 @@
           <a:p>
             <a:fld id="{A533EB26-2E25-4466-BA1F-4ED20A958A47}" type="datetimeFigureOut">
               <a:rPr lang="en-GB" smtClean="0"/>
-              <a:t>21/09/2022</a:t>
+              <a:t>13/03/2023</a:t>
             </a:fld>
             <a:endParaRPr lang="en-GB"/>
           </a:p>
@@ -1152,7 +1152,7 @@
           <a:p>
             <a:fld id="{A533EB26-2E25-4466-BA1F-4ED20A958A47}" type="datetimeFigureOut">
               <a:rPr lang="en-GB" smtClean="0"/>
-              <a:t>21/09/2022</a:t>
+              <a:t>13/03/2023</a:t>
             </a:fld>
             <a:endParaRPr lang="en-GB"/>
           </a:p>
@@ -1420,7 +1420,7 @@
           <a:p>
             <a:fld id="{A533EB26-2E25-4466-BA1F-4ED20A958A47}" type="datetimeFigureOut">
               <a:rPr lang="en-GB" smtClean="0"/>
-              <a:t>21/09/2022</a:t>
+              <a:t>13/03/2023</a:t>
             </a:fld>
             <a:endParaRPr lang="en-GB"/>
           </a:p>
@@ -1835,7 +1835,7 @@
           <a:p>
             <a:fld id="{A533EB26-2E25-4466-BA1F-4ED20A958A47}" type="datetimeFigureOut">
               <a:rPr lang="en-GB" smtClean="0"/>
-              <a:t>21/09/2022</a:t>
+              <a:t>13/03/2023</a:t>
             </a:fld>
             <a:endParaRPr lang="en-GB"/>
           </a:p>
@@ -1977,7 +1977,7 @@
           <a:p>
             <a:fld id="{A533EB26-2E25-4466-BA1F-4ED20A958A47}" type="datetimeFigureOut">
               <a:rPr lang="en-GB" smtClean="0"/>
-              <a:t>21/09/2022</a:t>
+              <a:t>13/03/2023</a:t>
             </a:fld>
             <a:endParaRPr lang="en-GB"/>
           </a:p>
@@ -2090,7 +2090,7 @@
           <a:p>
             <a:fld id="{A533EB26-2E25-4466-BA1F-4ED20A958A47}" type="datetimeFigureOut">
               <a:rPr lang="en-GB" smtClean="0"/>
-              <a:t>21/09/2022</a:t>
+              <a:t>13/03/2023</a:t>
             </a:fld>
             <a:endParaRPr lang="en-GB"/>
           </a:p>
@@ -2403,7 +2403,7 @@
           <a:p>
             <a:fld id="{A533EB26-2E25-4466-BA1F-4ED20A958A47}" type="datetimeFigureOut">
               <a:rPr lang="en-GB" smtClean="0"/>
-              <a:t>21/09/2022</a:t>
+              <a:t>13/03/2023</a:t>
             </a:fld>
             <a:endParaRPr lang="en-GB"/>
           </a:p>
@@ -2692,7 +2692,7 @@
           <a:p>
             <a:fld id="{A533EB26-2E25-4466-BA1F-4ED20A958A47}" type="datetimeFigureOut">
               <a:rPr lang="en-GB" smtClean="0"/>
-              <a:t>21/09/2022</a:t>
+              <a:t>13/03/2023</a:t>
             </a:fld>
             <a:endParaRPr lang="en-GB"/>
           </a:p>
@@ -2935,7 +2935,7 @@
           <a:p>
             <a:fld id="{A533EB26-2E25-4466-BA1F-4ED20A958A47}" type="datetimeFigureOut">
               <a:rPr lang="en-GB" smtClean="0"/>
-              <a:t>21/09/2022</a:t>
+              <a:t>13/03/2023</a:t>
             </a:fld>
             <a:endParaRPr lang="en-GB"/>
           </a:p>
@@ -3552,6 +3552,36 @@
               <a:t>)</a:t>
             </a:r>
           </a:p>
+          <a:p>
+            <a:endParaRPr lang="en-GB" dirty="0"/>
+          </a:p>
+          <a:p>
+            <a:r>
+              <a:rPr lang="en-GB" dirty="0"/>
+              <a:t>COURSEWORK READS: /scratch/</a:t>
+            </a:r>
+            <a:r>
+              <a:rPr lang="en-GB" dirty="0" err="1"/>
+              <a:t>bioinf</a:t>
+            </a:r>
+            <a:r>
+              <a:rPr lang="en-GB" dirty="0"/>
+              <a:t>/</a:t>
+            </a:r>
+            <a:r>
+              <a:rPr lang="en-GB" dirty="0" err="1"/>
+              <a:t>digital_health</a:t>
+            </a:r>
+            <a:r>
+              <a:rPr lang="en-GB" dirty="0"/>
+              <a:t>/</a:t>
+            </a:r>
+            <a:r>
+              <a:rPr lang="en-GB" dirty="0" err="1"/>
+              <a:t>coursework_reads</a:t>
+            </a:r>
+            <a:endParaRPr lang="en-GB" dirty="0"/>
+          </a:p>
         </p:txBody>
       </p:sp>
       <p:pic>
@@ -4651,6 +4681,32 @@
                   <a:srgbClr val="FF0000"/>
                 </a:solidFill>
               </a:rPr>
+              <a:t>Need to set up a </a:t>
+            </a:r>
+            <a:r>
+              <a:rPr lang="en-GB" sz="2400" dirty="0" err="1">
+                <a:solidFill>
+                  <a:srgbClr val="FF0000"/>
+                </a:solidFill>
+              </a:rPr>
+              <a:t>syn</a:t>
+            </a:r>
+            <a:r>
+              <a:rPr lang="en-GB" sz="2400" dirty="0">
+                <a:solidFill>
+                  <a:srgbClr val="FF0000"/>
+                </a:solidFill>
+              </a:rPr>
+              <a:t> link first???</a:t>
+            </a:r>
+          </a:p>
+          <a:p>
+            <a:r>
+              <a:rPr lang="en-GB" sz="2400" dirty="0">
+                <a:solidFill>
+                  <a:srgbClr val="FF0000"/>
+                </a:solidFill>
+              </a:rPr>
               <a:t>cp -</a:t>
             </a:r>
             <a:r>
@@ -4683,7 +4739,7 @@
                   <a:srgbClr val="FF0000"/>
                 </a:solidFill>
               </a:rPr>
-              <a:t>/BL4273/</a:t>
+              <a:t>/</a:t>
             </a:r>
             <a:r>
               <a:rPr lang="en-GB" sz="2400" dirty="0" err="1">
@@ -4691,7 +4747,15 @@
                   <a:srgbClr val="FF0000"/>
                 </a:solidFill>
               </a:rPr>
-              <a:t>genome_assembly_workshop</a:t>
+              <a:t>digital_health</a:t>
+            </a:r>
+            <a:r>
+              <a:rPr lang="en-GB" sz="2400">
+                <a:solidFill>
+                  <a:srgbClr val="FF0000"/>
+                </a:solidFill>
+              </a:rPr>
+              <a:t>/ </a:t>
             </a:r>
             <a:r>
               <a:rPr lang="en-GB" sz="2400" dirty="0">
@@ -4699,7 +4763,7 @@
                   <a:srgbClr val="FF0000"/>
                 </a:solidFill>
               </a:rPr>
-              <a:t> ~/scratch/</a:t>
+              <a:t>~/scratch/</a:t>
             </a:r>
             <a:r>
               <a:rPr lang="en-GB" sz="2400" dirty="0" err="1">

</xml_diff>